<commit_message>
Se añaden cambios a la presentacion
</commit_message>
<xml_diff>
--- a/Presentación_PPT_25_05_2022/CHARGING POINTS.pptx
+++ b/Presentación_PPT_25_05_2022/CHARGING POINTS.pptx
@@ -10,6 +10,8 @@
     <p:sldId id="258" r:id="rId4"/>
     <p:sldId id="260" r:id="rId5"/>
     <p:sldId id="259" r:id="rId6"/>
+    <p:sldId id="261" r:id="rId7"/>
+    <p:sldId id="262" r:id="rId8"/>
   </p:sldIdLst>
   <p:sldSz cx="12192000" cy="6858000"/>
   <p:notesSz cx="6858000" cy="9144000"/>
@@ -108,6 +110,11 @@
       </a:defRPr>
     </a:lvl9pPr>
   </p:defaultTextStyle>
+  <p:extLst>
+    <p:ext uri="{EFAFB233-063F-42B5-8137-9DF3F51BA10A}">
+      <p15:sldGuideLst xmlns:p15="http://schemas.microsoft.com/office/powerpoint/2012/main"/>
+    </p:ext>
+  </p:extLst>
 </p:presentation>
 </file>
 
@@ -6229,7 +6236,6 @@
               <a:rPr lang="es-ES" dirty="0"/>
               <a:t>La escasez de puntos de recarga es otra de las barreras que impiden un desarrollo más rápido del coche eléctrico.</a:t>
             </a:r>
-            <a:endParaRPr lang="es-ES" dirty="0"/>
           </a:p>
         </p:txBody>
       </p:sp>
@@ -6373,8 +6379,13 @@
             </a:r>
             <a:r>
               <a:rPr lang="es-ES" dirty="0" smtClean="0"/>
-              <a:t>en cuanto a puntos de carga.</a:t>
-            </a:r>
+              <a:t>en cuanto a puntos de </a:t>
+            </a:r>
+            <a:r>
+              <a:rPr lang="es-ES" dirty="0" smtClean="0"/>
+              <a:t>carga tanto públicos como privados.</a:t>
+            </a:r>
+            <a:endParaRPr lang="es-ES" dirty="0" smtClean="0"/>
           </a:p>
           <a:p>
             <a:endParaRPr lang="es-ES" dirty="0" smtClean="0"/>
@@ -6417,6 +6428,236 @@
     <p:extLst>
       <p:ext uri="{BB962C8B-B14F-4D97-AF65-F5344CB8AC3E}">
         <p14:creationId xmlns:p14="http://schemas.microsoft.com/office/powerpoint/2010/main" val="2731565589"/>
+      </p:ext>
+    </p:extLst>
+  </p:cSld>
+  <p:clrMapOvr>
+    <a:masterClrMapping/>
+  </p:clrMapOvr>
+</p:sld>
+</file>
+
+<file path=ppt/slides/slide6.xml><?xml version="1.0" encoding="utf-8"?>
+<p:sld xmlns:a="http://schemas.openxmlformats.org/drawingml/2006/main" xmlns:r="http://schemas.openxmlformats.org/officeDocument/2006/relationships" xmlns:p="http://schemas.openxmlformats.org/presentationml/2006/main">
+  <p:cSld>
+    <p:spTree>
+      <p:nvGrpSpPr>
+        <p:cNvPr id="1" name=""/>
+        <p:cNvGrpSpPr/>
+        <p:nvPr/>
+      </p:nvGrpSpPr>
+      <p:grpSpPr>
+        <a:xfrm>
+          <a:off x="0" y="0"/>
+          <a:ext cx="0" cy="0"/>
+          <a:chOff x="0" y="0"/>
+          <a:chExt cx="0" cy="0"/>
+        </a:xfrm>
+      </p:grpSpPr>
+      <p:sp>
+        <p:nvSpPr>
+          <p:cNvPr id="2" name="Título 1"/>
+          <p:cNvSpPr>
+            <a:spLocks noGrp="1"/>
+          </p:cNvSpPr>
+          <p:nvPr>
+            <p:ph type="title"/>
+          </p:nvPr>
+        </p:nvSpPr>
+        <p:spPr/>
+        <p:txBody>
+          <a:bodyPr/>
+          <a:lstStyle/>
+          <a:p>
+            <a:r>
+              <a:rPr lang="es-ES" dirty="0" smtClean="0"/>
+              <a:t>Ejemplo 1:</a:t>
+            </a:r>
+            <a:endParaRPr lang="es-ES" dirty="0"/>
+          </a:p>
+        </p:txBody>
+      </p:sp>
+      <p:sp>
+        <p:nvSpPr>
+          <p:cNvPr id="3" name="Marcador de contenido 2"/>
+          <p:cNvSpPr>
+            <a:spLocks noGrp="1"/>
+          </p:cNvSpPr>
+          <p:nvPr>
+            <p:ph idx="1"/>
+          </p:nvPr>
+        </p:nvSpPr>
+        <p:spPr/>
+        <p:txBody>
+          <a:bodyPr/>
+          <a:lstStyle/>
+          <a:p>
+            <a:r>
+              <a:rPr lang="es-ES" dirty="0" smtClean="0"/>
+              <a:t>Imaginemos un restaurante en una carretera estatal que pudiera establecer un punto de recarga para usuarios.</a:t>
+            </a:r>
+          </a:p>
+          <a:p>
+            <a:r>
+              <a:rPr lang="es-ES" dirty="0" smtClean="0"/>
+              <a:t>Indudablemente el atractivo para los clientes se vería incrementado si mientras realiza una parada para comer puede al mismo tiempo recargar su vehículo para después continuar con su trayecto.</a:t>
+            </a:r>
+          </a:p>
+          <a:p>
+            <a:endParaRPr lang="es-ES" dirty="0"/>
+          </a:p>
+        </p:txBody>
+      </p:sp>
+      <p:pic>
+        <p:nvPicPr>
+          <p:cNvPr id="4" name="Imagen 3"/>
+          <p:cNvPicPr>
+            <a:picLocks noChangeAspect="1"/>
+          </p:cNvPicPr>
+          <p:nvPr/>
+        </p:nvPicPr>
+        <p:blipFill>
+          <a:blip r:embed="rId2">
+            <a:extLst>
+              <a:ext uri="{28A0092B-C50C-407E-A947-70E740481C1C}">
+                <a14:useLocalDpi xmlns:a14="http://schemas.microsoft.com/office/drawing/2010/main" val="0"/>
+              </a:ext>
+            </a:extLst>
+          </a:blip>
+          <a:stretch>
+            <a:fillRect/>
+          </a:stretch>
+        </p:blipFill>
+        <p:spPr>
+          <a:xfrm>
+            <a:off x="3552225" y="4109039"/>
+            <a:ext cx="2576431" cy="1932323"/>
+          </a:xfrm>
+          <a:prstGeom prst="rect">
+            <a:avLst/>
+          </a:prstGeom>
+        </p:spPr>
+      </p:pic>
+    </p:spTree>
+    <p:extLst>
+      <p:ext uri="{BB962C8B-B14F-4D97-AF65-F5344CB8AC3E}">
+        <p14:creationId xmlns:p14="http://schemas.microsoft.com/office/powerpoint/2010/main" val="1558049198"/>
+      </p:ext>
+    </p:extLst>
+  </p:cSld>
+  <p:clrMapOvr>
+    <a:masterClrMapping/>
+  </p:clrMapOvr>
+</p:sld>
+</file>
+
+<file path=ppt/slides/slide7.xml><?xml version="1.0" encoding="utf-8"?>
+<p:sld xmlns:a="http://schemas.openxmlformats.org/drawingml/2006/main" xmlns:r="http://schemas.openxmlformats.org/officeDocument/2006/relationships" xmlns:p="http://schemas.openxmlformats.org/presentationml/2006/main">
+  <p:cSld>
+    <p:spTree>
+      <p:nvGrpSpPr>
+        <p:cNvPr id="1" name=""/>
+        <p:cNvGrpSpPr/>
+        <p:nvPr/>
+      </p:nvGrpSpPr>
+      <p:grpSpPr>
+        <a:xfrm>
+          <a:off x="0" y="0"/>
+          <a:ext cx="0" cy="0"/>
+          <a:chOff x="0" y="0"/>
+          <a:chExt cx="0" cy="0"/>
+        </a:xfrm>
+      </p:grpSpPr>
+      <p:sp>
+        <p:nvSpPr>
+          <p:cNvPr id="2" name="Título 1"/>
+          <p:cNvSpPr>
+            <a:spLocks noGrp="1"/>
+          </p:cNvSpPr>
+          <p:nvPr>
+            <p:ph type="title"/>
+          </p:nvPr>
+        </p:nvSpPr>
+        <p:spPr/>
+        <p:txBody>
+          <a:bodyPr/>
+          <a:lstStyle/>
+          <a:p>
+            <a:r>
+              <a:rPr lang="es-ES" dirty="0" smtClean="0"/>
+              <a:t>Ejemplo 2:</a:t>
+            </a:r>
+            <a:br>
+              <a:rPr lang="es-ES" dirty="0" smtClean="0"/>
+            </a:br>
+            <a:endParaRPr lang="es-ES" dirty="0"/>
+          </a:p>
+        </p:txBody>
+      </p:sp>
+      <p:sp>
+        <p:nvSpPr>
+          <p:cNvPr id="3" name="Marcador de contenido 2"/>
+          <p:cNvSpPr>
+            <a:spLocks noGrp="1"/>
+          </p:cNvSpPr>
+          <p:nvPr>
+            <p:ph idx="1"/>
+          </p:nvPr>
+        </p:nvSpPr>
+        <p:spPr/>
+        <p:txBody>
+          <a:bodyPr/>
+          <a:lstStyle/>
+          <a:p>
+            <a:r>
+              <a:rPr lang="es-ES" dirty="0" smtClean="0"/>
+              <a:t>Una casa en un punto de cualquier carretera estatal, con un punto de recarga de vehículos eléctricos en su garaje por ejemplo.</a:t>
+            </a:r>
+          </a:p>
+          <a:p>
+            <a:r>
+              <a:rPr lang="es-ES" dirty="0" smtClean="0"/>
+              <a:t>Podría suministrar a ese vehículo su carga en el trayecto que fuera oportuno.</a:t>
+            </a:r>
+          </a:p>
+          <a:p>
+            <a:endParaRPr lang="es-ES" dirty="0"/>
+          </a:p>
+        </p:txBody>
+      </p:sp>
+      <p:pic>
+        <p:nvPicPr>
+          <p:cNvPr id="4" name="Imagen 3"/>
+          <p:cNvPicPr>
+            <a:picLocks noChangeAspect="1"/>
+          </p:cNvPicPr>
+          <p:nvPr/>
+        </p:nvPicPr>
+        <p:blipFill rotWithShape="1">
+          <a:blip r:embed="rId2">
+            <a:extLst>
+              <a:ext uri="{28A0092B-C50C-407E-A947-70E740481C1C}">
+                <a14:useLocalDpi xmlns:a14="http://schemas.microsoft.com/office/drawing/2010/main" val="0"/>
+              </a:ext>
+            </a:extLst>
+          </a:blip>
+          <a:srcRect t="21905" r="-1451" b="14762"/>
+          <a:stretch/>
+        </p:blipFill>
+        <p:spPr>
+          <a:xfrm>
+            <a:off x="3385457" y="3739882"/>
+            <a:ext cx="3690256" cy="1909803"/>
+          </a:xfrm>
+          <a:prstGeom prst="rect">
+            <a:avLst/>
+          </a:prstGeom>
+        </p:spPr>
+      </p:pic>
+    </p:spTree>
+    <p:extLst>
+      <p:ext uri="{BB962C8B-B14F-4D97-AF65-F5344CB8AC3E}">
+        <p14:creationId xmlns:p14="http://schemas.microsoft.com/office/powerpoint/2010/main" val="2446105201"/>
       </p:ext>
     </p:extLst>
   </p:cSld>

</xml_diff>